<commit_message>
Added a lerp breakdown png img
</commit_message>
<xml_diff>
--- a/MathFunctions.pptx
+++ b/MathFunctions.pptx
@@ -6,6 +6,7 @@
   </p:sldMasterIdLst>
   <p:sldIdLst>
     <p:sldId id="256" r:id="rId2"/>
+    <p:sldId id="257" r:id="rId3"/>
   </p:sldIdLst>
   <p:sldSz cx="12192000" cy="6858000"/>
   <p:notesSz cx="6858000" cy="9144000"/>
@@ -104,6 +105,11 @@
       </a:defRPr>
     </a:lvl9pPr>
   </p:defaultTextStyle>
+  <p:extLst>
+    <p:ext uri="{EFAFB233-063F-42B5-8137-9DF3F51BA10A}">
+      <p15:sldGuideLst xmlns:p15="http://schemas.microsoft.com/office/powerpoint/2012/main"/>
+    </p:ext>
+  </p:extLst>
 </p:presentation>
 </file>
 
@@ -254,7 +260,7 @@
           <a:p>
             <a:fld id="{821532E0-4878-47AC-A3A2-965023ADA1C9}" type="datetimeFigureOut">
               <a:rPr lang="en-US" smtClean="0"/>
-              <a:t>2/16/2024</a:t>
+              <a:t>2/20/2024</a:t>
             </a:fld>
             <a:endParaRPr lang="en-US"/>
           </a:p>
@@ -452,7 +458,7 @@
           <a:p>
             <a:fld id="{821532E0-4878-47AC-A3A2-965023ADA1C9}" type="datetimeFigureOut">
               <a:rPr lang="en-US" smtClean="0"/>
-              <a:t>2/16/2024</a:t>
+              <a:t>2/20/2024</a:t>
             </a:fld>
             <a:endParaRPr lang="en-US"/>
           </a:p>
@@ -660,7 +666,7 @@
           <a:p>
             <a:fld id="{821532E0-4878-47AC-A3A2-965023ADA1C9}" type="datetimeFigureOut">
               <a:rPr lang="en-US" smtClean="0"/>
-              <a:t>2/16/2024</a:t>
+              <a:t>2/20/2024</a:t>
             </a:fld>
             <a:endParaRPr lang="en-US"/>
           </a:p>
@@ -858,7 +864,7 @@
           <a:p>
             <a:fld id="{821532E0-4878-47AC-A3A2-965023ADA1C9}" type="datetimeFigureOut">
               <a:rPr lang="en-US" smtClean="0"/>
-              <a:t>2/16/2024</a:t>
+              <a:t>2/20/2024</a:t>
             </a:fld>
             <a:endParaRPr lang="en-US"/>
           </a:p>
@@ -1133,7 +1139,7 @@
           <a:p>
             <a:fld id="{821532E0-4878-47AC-A3A2-965023ADA1C9}" type="datetimeFigureOut">
               <a:rPr lang="en-US" smtClean="0"/>
-              <a:t>2/16/2024</a:t>
+              <a:t>2/20/2024</a:t>
             </a:fld>
             <a:endParaRPr lang="en-US"/>
           </a:p>
@@ -1398,7 +1404,7 @@
           <a:p>
             <a:fld id="{821532E0-4878-47AC-A3A2-965023ADA1C9}" type="datetimeFigureOut">
               <a:rPr lang="en-US" smtClean="0"/>
-              <a:t>2/16/2024</a:t>
+              <a:t>2/20/2024</a:t>
             </a:fld>
             <a:endParaRPr lang="en-US"/>
           </a:p>
@@ -1810,7 +1816,7 @@
           <a:p>
             <a:fld id="{821532E0-4878-47AC-A3A2-965023ADA1C9}" type="datetimeFigureOut">
               <a:rPr lang="en-US" smtClean="0"/>
-              <a:t>2/16/2024</a:t>
+              <a:t>2/20/2024</a:t>
             </a:fld>
             <a:endParaRPr lang="en-US"/>
           </a:p>
@@ -1951,7 +1957,7 @@
           <a:p>
             <a:fld id="{821532E0-4878-47AC-A3A2-965023ADA1C9}" type="datetimeFigureOut">
               <a:rPr lang="en-US" smtClean="0"/>
-              <a:t>2/16/2024</a:t>
+              <a:t>2/20/2024</a:t>
             </a:fld>
             <a:endParaRPr lang="en-US"/>
           </a:p>
@@ -2064,7 +2070,7 @@
           <a:p>
             <a:fld id="{821532E0-4878-47AC-A3A2-965023ADA1C9}" type="datetimeFigureOut">
               <a:rPr lang="en-US" smtClean="0"/>
-              <a:t>2/16/2024</a:t>
+              <a:t>2/20/2024</a:t>
             </a:fld>
             <a:endParaRPr lang="en-US"/>
           </a:p>
@@ -2375,7 +2381,7 @@
           <a:p>
             <a:fld id="{821532E0-4878-47AC-A3A2-965023ADA1C9}" type="datetimeFigureOut">
               <a:rPr lang="en-US" smtClean="0"/>
-              <a:t>2/16/2024</a:t>
+              <a:t>2/20/2024</a:t>
             </a:fld>
             <a:endParaRPr lang="en-US"/>
           </a:p>
@@ -2663,7 +2669,7 @@
           <a:p>
             <a:fld id="{821532E0-4878-47AC-A3A2-965023ADA1C9}" type="datetimeFigureOut">
               <a:rPr lang="en-US" smtClean="0"/>
-              <a:t>2/16/2024</a:t>
+              <a:t>2/20/2024</a:t>
             </a:fld>
             <a:endParaRPr lang="en-US"/>
           </a:p>
@@ -2904,7 +2910,7 @@
           <a:p>
             <a:fld id="{821532E0-4878-47AC-A3A2-965023ADA1C9}" type="datetimeFigureOut">
               <a:rPr lang="en-US" smtClean="0"/>
-              <a:t>2/16/2024</a:t>
+              <a:t>2/20/2024</a:t>
             </a:fld>
             <a:endParaRPr lang="en-US"/>
           </a:p>
@@ -3684,6 +3690,1392 @@
 </p:sld>
 </file>
 
+<file path=ppt/slides/slide2.xml><?xml version="1.0" encoding="utf-8"?>
+<p:sld xmlns:a="http://schemas.openxmlformats.org/drawingml/2006/main" xmlns:r="http://schemas.openxmlformats.org/officeDocument/2006/relationships" xmlns:p="http://schemas.openxmlformats.org/presentationml/2006/main">
+  <p:cSld>
+    <p:bg>
+      <p:bgPr>
+        <a:solidFill>
+          <a:schemeClr val="tx1"/>
+        </a:solidFill>
+        <a:effectLst/>
+      </p:bgPr>
+    </p:bg>
+    <p:spTree>
+      <p:nvGrpSpPr>
+        <p:cNvPr id="1" name=""/>
+        <p:cNvGrpSpPr/>
+        <p:nvPr/>
+      </p:nvGrpSpPr>
+      <p:grpSpPr>
+        <a:xfrm>
+          <a:off x="0" y="0"/>
+          <a:ext cx="0" cy="0"/>
+          <a:chOff x="0" y="0"/>
+          <a:chExt cx="0" cy="0"/>
+        </a:xfrm>
+      </p:grpSpPr>
+      <p:sp>
+        <p:nvSpPr>
+          <p:cNvPr id="2" name="TextBox 1">
+            <a:extLst>
+              <a:ext uri="{FF2B5EF4-FFF2-40B4-BE49-F238E27FC236}">
+                <a16:creationId xmlns:a16="http://schemas.microsoft.com/office/drawing/2014/main" id="{6EE86DD0-BCC2-F547-7AED-D17AF5168DA2}"/>
+              </a:ext>
+            </a:extLst>
+          </p:cNvPr>
+          <p:cNvSpPr txBox="1"/>
+          <p:nvPr/>
+        </p:nvSpPr>
+        <p:spPr>
+          <a:xfrm>
+            <a:off x="99392" y="129209"/>
+            <a:ext cx="4556888" cy="584775"/>
+          </a:xfrm>
+          <a:prstGeom prst="rect">
+            <a:avLst/>
+          </a:prstGeom>
+          <a:noFill/>
+        </p:spPr>
+        <p:txBody>
+          <a:bodyPr wrap="none" rtlCol="0">
+            <a:spAutoFit/>
+          </a:bodyPr>
+          <a:lstStyle/>
+          <a:p>
+            <a:r>
+              <a:rPr lang="en-US" sz="3200" dirty="0">
+                <a:solidFill>
+                  <a:srgbClr val="FF0000"/>
+                </a:solidFill>
+              </a:rPr>
+              <a:t>Lerp (Linear interpolation)</a:t>
+            </a:r>
+          </a:p>
+        </p:txBody>
+      </p:sp>
+      <p:pic>
+        <p:nvPicPr>
+          <p:cNvPr id="4" name="Picture 3">
+            <a:extLst>
+              <a:ext uri="{FF2B5EF4-FFF2-40B4-BE49-F238E27FC236}">
+                <a16:creationId xmlns:a16="http://schemas.microsoft.com/office/drawing/2014/main" id="{A6BD2404-A477-8E29-690C-922769DC84F5}"/>
+              </a:ext>
+            </a:extLst>
+          </p:cNvPr>
+          <p:cNvPicPr>
+            <a:picLocks noChangeAspect="1"/>
+          </p:cNvPicPr>
+          <p:nvPr/>
+        </p:nvPicPr>
+        <p:blipFill>
+          <a:blip r:embed="rId2"/>
+          <a:stretch>
+            <a:fillRect/>
+          </a:stretch>
+        </p:blipFill>
+        <p:spPr>
+          <a:xfrm>
+            <a:off x="97933" y="713984"/>
+            <a:ext cx="6977229" cy="4426266"/>
+          </a:xfrm>
+          <a:prstGeom prst="rect">
+            <a:avLst/>
+          </a:prstGeom>
+        </p:spPr>
+      </p:pic>
+      <p:sp>
+        <p:nvSpPr>
+          <p:cNvPr id="11" name="TextBox 10">
+            <a:extLst>
+              <a:ext uri="{FF2B5EF4-FFF2-40B4-BE49-F238E27FC236}">
+                <a16:creationId xmlns:a16="http://schemas.microsoft.com/office/drawing/2014/main" id="{A3D536B0-3E5F-49A7-E8FE-1020F2FD3B6C}"/>
+              </a:ext>
+            </a:extLst>
+          </p:cNvPr>
+          <p:cNvSpPr txBox="1"/>
+          <p:nvPr/>
+        </p:nvSpPr>
+        <p:spPr>
+          <a:xfrm>
+            <a:off x="4890189" y="228599"/>
+            <a:ext cx="3743910" cy="2308324"/>
+          </a:xfrm>
+          <a:prstGeom prst="rect">
+            <a:avLst/>
+          </a:prstGeom>
+          <a:noFill/>
+        </p:spPr>
+        <p:txBody>
+          <a:bodyPr wrap="none" rtlCol="0">
+            <a:spAutoFit/>
+          </a:bodyPr>
+          <a:lstStyle/>
+          <a:p>
+            <a:r>
+              <a:rPr lang="en-US" dirty="0">
+                <a:solidFill>
+                  <a:srgbClr val="00B0F0"/>
+                </a:solidFill>
+              </a:rPr>
+              <a:t>For dealing with finite ranges such as;</a:t>
+            </a:r>
+          </a:p>
+          <a:p>
+            <a:r>
+              <a:rPr lang="en-US" dirty="0">
+                <a:solidFill>
+                  <a:srgbClr val="00B0F0"/>
+                </a:solidFill>
+              </a:rPr>
+              <a:t>0.000 to 0.020, its best to “normalize”</a:t>
+            </a:r>
+          </a:p>
+          <a:p>
+            <a:r>
+              <a:rPr lang="en-US" dirty="0">
+                <a:solidFill>
+                  <a:srgbClr val="00B0F0"/>
+                </a:solidFill>
+              </a:rPr>
+              <a:t>said range such that it falls between a</a:t>
+            </a:r>
+          </a:p>
+          <a:p>
+            <a:r>
+              <a:rPr lang="en-US" dirty="0">
+                <a:solidFill>
+                  <a:srgbClr val="00B0F0"/>
+                </a:solidFill>
+              </a:rPr>
+              <a:t>range of 0 and 1. Once its normalized</a:t>
+            </a:r>
+          </a:p>
+          <a:p>
+            <a:r>
+              <a:rPr lang="en-US" dirty="0">
+                <a:solidFill>
+                  <a:srgbClr val="00B0F0"/>
+                </a:solidFill>
+              </a:rPr>
+              <a:t>it can then be fed into a standard lerp</a:t>
+            </a:r>
+          </a:p>
+          <a:p>
+            <a:r>
+              <a:rPr lang="en-US" dirty="0">
+                <a:solidFill>
+                  <a:srgbClr val="00B0F0"/>
+                </a:solidFill>
+              </a:rPr>
+              <a:t>function such that “a” and “b” scaling</a:t>
+            </a:r>
+          </a:p>
+          <a:p>
+            <a:r>
+              <a:rPr lang="en-US" dirty="0">
+                <a:solidFill>
+                  <a:srgbClr val="00B0F0"/>
+                </a:solidFill>
+              </a:rPr>
+              <a:t>can be derived from the normalized </a:t>
+            </a:r>
+          </a:p>
+          <a:p>
+            <a:r>
+              <a:rPr lang="en-US" dirty="0">
+                <a:solidFill>
+                  <a:srgbClr val="00B0F0"/>
+                </a:solidFill>
+              </a:rPr>
+              <a:t>range.</a:t>
+            </a:r>
+          </a:p>
+        </p:txBody>
+      </p:sp>
+      <p:cxnSp>
+        <p:nvCxnSpPr>
+          <p:cNvPr id="26" name="Straight Connector 25">
+            <a:extLst>
+              <a:ext uri="{FF2B5EF4-FFF2-40B4-BE49-F238E27FC236}">
+                <a16:creationId xmlns:a16="http://schemas.microsoft.com/office/drawing/2014/main" id="{86D7D521-DE05-4FC5-8859-2326D39CD5AC}"/>
+              </a:ext>
+            </a:extLst>
+          </p:cNvPr>
+          <p:cNvCxnSpPr/>
+          <p:nvPr/>
+        </p:nvCxnSpPr>
+        <p:spPr>
+          <a:xfrm>
+            <a:off x="7988300" y="5764530"/>
+            <a:ext cx="3479800" cy="0"/>
+          </a:xfrm>
+          <a:prstGeom prst="line">
+            <a:avLst/>
+          </a:prstGeom>
+        </p:spPr>
+        <p:style>
+          <a:lnRef idx="1">
+            <a:schemeClr val="accent1"/>
+          </a:lnRef>
+          <a:fillRef idx="0">
+            <a:schemeClr val="accent1"/>
+          </a:fillRef>
+          <a:effectRef idx="0">
+            <a:schemeClr val="accent1"/>
+          </a:effectRef>
+          <a:fontRef idx="minor">
+            <a:schemeClr val="tx1"/>
+          </a:fontRef>
+        </p:style>
+      </p:cxnSp>
+      <p:cxnSp>
+        <p:nvCxnSpPr>
+          <p:cNvPr id="27" name="Straight Connector 26">
+            <a:extLst>
+              <a:ext uri="{FF2B5EF4-FFF2-40B4-BE49-F238E27FC236}">
+                <a16:creationId xmlns:a16="http://schemas.microsoft.com/office/drawing/2014/main" id="{1591729D-211E-37D8-9C1D-343A3A217BFC}"/>
+              </a:ext>
+            </a:extLst>
+          </p:cNvPr>
+          <p:cNvCxnSpPr>
+            <a:cxnSpLocks/>
+          </p:cNvCxnSpPr>
+          <p:nvPr/>
+        </p:nvCxnSpPr>
+        <p:spPr>
+          <a:xfrm>
+            <a:off x="7988300" y="5602605"/>
+            <a:ext cx="0" cy="323850"/>
+          </a:xfrm>
+          <a:prstGeom prst="line">
+            <a:avLst/>
+          </a:prstGeom>
+        </p:spPr>
+        <p:style>
+          <a:lnRef idx="1">
+            <a:schemeClr val="accent1"/>
+          </a:lnRef>
+          <a:fillRef idx="0">
+            <a:schemeClr val="accent1"/>
+          </a:fillRef>
+          <a:effectRef idx="0">
+            <a:schemeClr val="accent1"/>
+          </a:effectRef>
+          <a:fontRef idx="minor">
+            <a:schemeClr val="tx1"/>
+          </a:fontRef>
+        </p:style>
+      </p:cxnSp>
+      <p:cxnSp>
+        <p:nvCxnSpPr>
+          <p:cNvPr id="29" name="Straight Connector 28">
+            <a:extLst>
+              <a:ext uri="{FF2B5EF4-FFF2-40B4-BE49-F238E27FC236}">
+                <a16:creationId xmlns:a16="http://schemas.microsoft.com/office/drawing/2014/main" id="{BB26865C-EC3F-2EF3-CCAC-E7C750A1161C}"/>
+              </a:ext>
+            </a:extLst>
+          </p:cNvPr>
+          <p:cNvCxnSpPr>
+            <a:cxnSpLocks/>
+          </p:cNvCxnSpPr>
+          <p:nvPr/>
+        </p:nvCxnSpPr>
+        <p:spPr>
+          <a:xfrm>
+            <a:off x="11468100" y="5602605"/>
+            <a:ext cx="0" cy="323850"/>
+          </a:xfrm>
+          <a:prstGeom prst="line">
+            <a:avLst/>
+          </a:prstGeom>
+        </p:spPr>
+        <p:style>
+          <a:lnRef idx="1">
+            <a:schemeClr val="accent1"/>
+          </a:lnRef>
+          <a:fillRef idx="0">
+            <a:schemeClr val="accent1"/>
+          </a:fillRef>
+          <a:effectRef idx="0">
+            <a:schemeClr val="accent1"/>
+          </a:effectRef>
+          <a:fontRef idx="minor">
+            <a:schemeClr val="tx1"/>
+          </a:fontRef>
+        </p:style>
+      </p:cxnSp>
+      <p:cxnSp>
+        <p:nvCxnSpPr>
+          <p:cNvPr id="30" name="Straight Connector 29">
+            <a:extLst>
+              <a:ext uri="{FF2B5EF4-FFF2-40B4-BE49-F238E27FC236}">
+                <a16:creationId xmlns:a16="http://schemas.microsoft.com/office/drawing/2014/main" id="{733302E4-FF3E-79F6-2868-12AE0CC0A558}"/>
+              </a:ext>
+            </a:extLst>
+          </p:cNvPr>
+          <p:cNvCxnSpPr>
+            <a:cxnSpLocks/>
+          </p:cNvCxnSpPr>
+          <p:nvPr/>
+        </p:nvCxnSpPr>
+        <p:spPr>
+          <a:xfrm>
+            <a:off x="9779000" y="5602605"/>
+            <a:ext cx="0" cy="323850"/>
+          </a:xfrm>
+          <a:prstGeom prst="line">
+            <a:avLst/>
+          </a:prstGeom>
+        </p:spPr>
+        <p:style>
+          <a:lnRef idx="1">
+            <a:schemeClr val="accent1"/>
+          </a:lnRef>
+          <a:fillRef idx="0">
+            <a:schemeClr val="accent1"/>
+          </a:fillRef>
+          <a:effectRef idx="0">
+            <a:schemeClr val="accent1"/>
+          </a:effectRef>
+          <a:fontRef idx="minor">
+            <a:schemeClr val="tx1"/>
+          </a:fontRef>
+        </p:style>
+      </p:cxnSp>
+      <p:cxnSp>
+        <p:nvCxnSpPr>
+          <p:cNvPr id="32" name="Straight Connector 31">
+            <a:extLst>
+              <a:ext uri="{FF2B5EF4-FFF2-40B4-BE49-F238E27FC236}">
+                <a16:creationId xmlns:a16="http://schemas.microsoft.com/office/drawing/2014/main" id="{DD630576-37A0-F280-6BC6-F46F79D68931}"/>
+              </a:ext>
+            </a:extLst>
+          </p:cNvPr>
+          <p:cNvCxnSpPr>
+            <a:cxnSpLocks/>
+          </p:cNvCxnSpPr>
+          <p:nvPr/>
+        </p:nvCxnSpPr>
+        <p:spPr>
+          <a:xfrm>
+            <a:off x="8634099" y="3222100"/>
+            <a:ext cx="2262501" cy="0"/>
+          </a:xfrm>
+          <a:prstGeom prst="line">
+            <a:avLst/>
+          </a:prstGeom>
+        </p:spPr>
+        <p:style>
+          <a:lnRef idx="1">
+            <a:schemeClr val="accent1"/>
+          </a:lnRef>
+          <a:fillRef idx="0">
+            <a:schemeClr val="accent1"/>
+          </a:fillRef>
+          <a:effectRef idx="0">
+            <a:schemeClr val="accent1"/>
+          </a:effectRef>
+          <a:fontRef idx="minor">
+            <a:schemeClr val="tx1"/>
+          </a:fontRef>
+        </p:style>
+      </p:cxnSp>
+      <p:cxnSp>
+        <p:nvCxnSpPr>
+          <p:cNvPr id="33" name="Straight Connector 32">
+            <a:extLst>
+              <a:ext uri="{FF2B5EF4-FFF2-40B4-BE49-F238E27FC236}">
+                <a16:creationId xmlns:a16="http://schemas.microsoft.com/office/drawing/2014/main" id="{44B403C8-AD1A-61FF-0DC6-5E46155B132B}"/>
+              </a:ext>
+            </a:extLst>
+          </p:cNvPr>
+          <p:cNvCxnSpPr>
+            <a:cxnSpLocks/>
+          </p:cNvCxnSpPr>
+          <p:nvPr/>
+        </p:nvCxnSpPr>
+        <p:spPr>
+          <a:xfrm>
+            <a:off x="8634099" y="3060175"/>
+            <a:ext cx="0" cy="323850"/>
+          </a:xfrm>
+          <a:prstGeom prst="line">
+            <a:avLst/>
+          </a:prstGeom>
+        </p:spPr>
+        <p:style>
+          <a:lnRef idx="1">
+            <a:schemeClr val="accent1"/>
+          </a:lnRef>
+          <a:fillRef idx="0">
+            <a:schemeClr val="accent1"/>
+          </a:fillRef>
+          <a:effectRef idx="0">
+            <a:schemeClr val="accent1"/>
+          </a:effectRef>
+          <a:fontRef idx="minor">
+            <a:schemeClr val="tx1"/>
+          </a:fontRef>
+        </p:style>
+      </p:cxnSp>
+      <p:cxnSp>
+        <p:nvCxnSpPr>
+          <p:cNvPr id="34" name="Straight Connector 33">
+            <a:extLst>
+              <a:ext uri="{FF2B5EF4-FFF2-40B4-BE49-F238E27FC236}">
+                <a16:creationId xmlns:a16="http://schemas.microsoft.com/office/drawing/2014/main" id="{79CEA596-3551-8F75-7C60-BE94E8FBC80A}"/>
+              </a:ext>
+            </a:extLst>
+          </p:cNvPr>
+          <p:cNvCxnSpPr>
+            <a:cxnSpLocks/>
+          </p:cNvCxnSpPr>
+          <p:nvPr/>
+        </p:nvCxnSpPr>
+        <p:spPr>
+          <a:xfrm>
+            <a:off x="10900577" y="3059015"/>
+            <a:ext cx="0" cy="323850"/>
+          </a:xfrm>
+          <a:prstGeom prst="line">
+            <a:avLst/>
+          </a:prstGeom>
+        </p:spPr>
+        <p:style>
+          <a:lnRef idx="1">
+            <a:schemeClr val="accent1"/>
+          </a:lnRef>
+          <a:fillRef idx="0">
+            <a:schemeClr val="accent1"/>
+          </a:fillRef>
+          <a:effectRef idx="0">
+            <a:schemeClr val="accent1"/>
+          </a:effectRef>
+          <a:fontRef idx="minor">
+            <a:schemeClr val="tx1"/>
+          </a:fontRef>
+        </p:style>
+      </p:cxnSp>
+      <p:cxnSp>
+        <p:nvCxnSpPr>
+          <p:cNvPr id="35" name="Straight Connector 34">
+            <a:extLst>
+              <a:ext uri="{FF2B5EF4-FFF2-40B4-BE49-F238E27FC236}">
+                <a16:creationId xmlns:a16="http://schemas.microsoft.com/office/drawing/2014/main" id="{7CA89078-C2BC-5178-66A3-C9A5A670DEA8}"/>
+              </a:ext>
+            </a:extLst>
+          </p:cNvPr>
+          <p:cNvCxnSpPr>
+            <a:cxnSpLocks/>
+          </p:cNvCxnSpPr>
+          <p:nvPr/>
+        </p:nvCxnSpPr>
+        <p:spPr>
+          <a:xfrm>
+            <a:off x="9779000" y="3060175"/>
+            <a:ext cx="0" cy="323850"/>
+          </a:xfrm>
+          <a:prstGeom prst="line">
+            <a:avLst/>
+          </a:prstGeom>
+        </p:spPr>
+        <p:style>
+          <a:lnRef idx="1">
+            <a:schemeClr val="accent1"/>
+          </a:lnRef>
+          <a:fillRef idx="0">
+            <a:schemeClr val="accent1"/>
+          </a:fillRef>
+          <a:effectRef idx="0">
+            <a:schemeClr val="accent1"/>
+          </a:effectRef>
+          <a:fontRef idx="minor">
+            <a:schemeClr val="tx1"/>
+          </a:fontRef>
+        </p:style>
+      </p:cxnSp>
+      <p:cxnSp>
+        <p:nvCxnSpPr>
+          <p:cNvPr id="41" name="Straight Connector 40">
+            <a:extLst>
+              <a:ext uri="{FF2B5EF4-FFF2-40B4-BE49-F238E27FC236}">
+                <a16:creationId xmlns:a16="http://schemas.microsoft.com/office/drawing/2014/main" id="{77C0AB87-5B35-072A-6E17-AC66253A15C7}"/>
+              </a:ext>
+            </a:extLst>
+          </p:cNvPr>
+          <p:cNvCxnSpPr>
+            <a:cxnSpLocks/>
+          </p:cNvCxnSpPr>
+          <p:nvPr/>
+        </p:nvCxnSpPr>
+        <p:spPr>
+          <a:xfrm>
+            <a:off x="8641719" y="4557589"/>
+            <a:ext cx="2262501" cy="0"/>
+          </a:xfrm>
+          <a:prstGeom prst="line">
+            <a:avLst/>
+          </a:prstGeom>
+        </p:spPr>
+        <p:style>
+          <a:lnRef idx="1">
+            <a:schemeClr val="accent1"/>
+          </a:lnRef>
+          <a:fillRef idx="0">
+            <a:schemeClr val="accent1"/>
+          </a:fillRef>
+          <a:effectRef idx="0">
+            <a:schemeClr val="accent1"/>
+          </a:effectRef>
+          <a:fontRef idx="minor">
+            <a:schemeClr val="tx1"/>
+          </a:fontRef>
+        </p:style>
+      </p:cxnSp>
+      <p:cxnSp>
+        <p:nvCxnSpPr>
+          <p:cNvPr id="42" name="Straight Connector 41">
+            <a:extLst>
+              <a:ext uri="{FF2B5EF4-FFF2-40B4-BE49-F238E27FC236}">
+                <a16:creationId xmlns:a16="http://schemas.microsoft.com/office/drawing/2014/main" id="{3250DD7D-9F84-9333-1DB0-AFAA486F4474}"/>
+              </a:ext>
+            </a:extLst>
+          </p:cNvPr>
+          <p:cNvCxnSpPr>
+            <a:cxnSpLocks/>
+          </p:cNvCxnSpPr>
+          <p:nvPr/>
+        </p:nvCxnSpPr>
+        <p:spPr>
+          <a:xfrm>
+            <a:off x="8641719" y="4395664"/>
+            <a:ext cx="0" cy="323850"/>
+          </a:xfrm>
+          <a:prstGeom prst="line">
+            <a:avLst/>
+          </a:prstGeom>
+        </p:spPr>
+        <p:style>
+          <a:lnRef idx="1">
+            <a:schemeClr val="accent1"/>
+          </a:lnRef>
+          <a:fillRef idx="0">
+            <a:schemeClr val="accent1"/>
+          </a:fillRef>
+          <a:effectRef idx="0">
+            <a:schemeClr val="accent1"/>
+          </a:effectRef>
+          <a:fontRef idx="minor">
+            <a:schemeClr val="tx1"/>
+          </a:fontRef>
+        </p:style>
+      </p:cxnSp>
+      <p:cxnSp>
+        <p:nvCxnSpPr>
+          <p:cNvPr id="43" name="Straight Connector 42">
+            <a:extLst>
+              <a:ext uri="{FF2B5EF4-FFF2-40B4-BE49-F238E27FC236}">
+                <a16:creationId xmlns:a16="http://schemas.microsoft.com/office/drawing/2014/main" id="{283716F0-125D-9CE0-116B-5C817B3105BE}"/>
+              </a:ext>
+            </a:extLst>
+          </p:cNvPr>
+          <p:cNvCxnSpPr>
+            <a:cxnSpLocks/>
+          </p:cNvCxnSpPr>
+          <p:nvPr/>
+        </p:nvCxnSpPr>
+        <p:spPr>
+          <a:xfrm>
+            <a:off x="10908197" y="4394504"/>
+            <a:ext cx="0" cy="323850"/>
+          </a:xfrm>
+          <a:prstGeom prst="line">
+            <a:avLst/>
+          </a:prstGeom>
+        </p:spPr>
+        <p:style>
+          <a:lnRef idx="1">
+            <a:schemeClr val="accent1"/>
+          </a:lnRef>
+          <a:fillRef idx="0">
+            <a:schemeClr val="accent1"/>
+          </a:fillRef>
+          <a:effectRef idx="0">
+            <a:schemeClr val="accent1"/>
+          </a:effectRef>
+          <a:fontRef idx="minor">
+            <a:schemeClr val="tx1"/>
+          </a:fontRef>
+        </p:style>
+      </p:cxnSp>
+      <p:cxnSp>
+        <p:nvCxnSpPr>
+          <p:cNvPr id="44" name="Straight Connector 43">
+            <a:extLst>
+              <a:ext uri="{FF2B5EF4-FFF2-40B4-BE49-F238E27FC236}">
+                <a16:creationId xmlns:a16="http://schemas.microsoft.com/office/drawing/2014/main" id="{F5D1E8A0-143E-9243-72AA-497D9F4E945A}"/>
+              </a:ext>
+            </a:extLst>
+          </p:cNvPr>
+          <p:cNvCxnSpPr>
+            <a:cxnSpLocks/>
+          </p:cNvCxnSpPr>
+          <p:nvPr/>
+        </p:nvCxnSpPr>
+        <p:spPr>
+          <a:xfrm>
+            <a:off x="9786620" y="4395664"/>
+            <a:ext cx="0" cy="323850"/>
+          </a:xfrm>
+          <a:prstGeom prst="line">
+            <a:avLst/>
+          </a:prstGeom>
+        </p:spPr>
+        <p:style>
+          <a:lnRef idx="1">
+            <a:schemeClr val="accent1"/>
+          </a:lnRef>
+          <a:fillRef idx="0">
+            <a:schemeClr val="accent1"/>
+          </a:fillRef>
+          <a:effectRef idx="0">
+            <a:schemeClr val="accent1"/>
+          </a:effectRef>
+          <a:fontRef idx="minor">
+            <a:schemeClr val="tx1"/>
+          </a:fontRef>
+        </p:style>
+      </p:cxnSp>
+      <p:sp>
+        <p:nvSpPr>
+          <p:cNvPr id="45" name="TextBox 44">
+            <a:extLst>
+              <a:ext uri="{FF2B5EF4-FFF2-40B4-BE49-F238E27FC236}">
+                <a16:creationId xmlns:a16="http://schemas.microsoft.com/office/drawing/2014/main" id="{A16110F9-0B6F-278B-DAB5-D5F1D1CEA605}"/>
+              </a:ext>
+            </a:extLst>
+          </p:cNvPr>
+          <p:cNvSpPr txBox="1"/>
+          <p:nvPr/>
+        </p:nvSpPr>
+        <p:spPr>
+          <a:xfrm>
+            <a:off x="8365765" y="2755164"/>
+            <a:ext cx="710451" cy="369332"/>
+          </a:xfrm>
+          <a:prstGeom prst="rect">
+            <a:avLst/>
+          </a:prstGeom>
+          <a:noFill/>
+        </p:spPr>
+        <p:txBody>
+          <a:bodyPr wrap="none" rtlCol="0">
+            <a:spAutoFit/>
+          </a:bodyPr>
+          <a:lstStyle/>
+          <a:p>
+            <a:r>
+              <a:rPr lang="en-US" dirty="0">
+                <a:solidFill>
+                  <a:srgbClr val="FFFF00"/>
+                </a:solidFill>
+              </a:rPr>
+              <a:t>0.000</a:t>
+            </a:r>
+          </a:p>
+        </p:txBody>
+      </p:sp>
+      <p:sp>
+        <p:nvSpPr>
+          <p:cNvPr id="46" name="TextBox 45">
+            <a:extLst>
+              <a:ext uri="{FF2B5EF4-FFF2-40B4-BE49-F238E27FC236}">
+                <a16:creationId xmlns:a16="http://schemas.microsoft.com/office/drawing/2014/main" id="{A533E2FA-2D78-F9A5-FC66-70B29C90E78E}"/>
+              </a:ext>
+            </a:extLst>
+          </p:cNvPr>
+          <p:cNvSpPr txBox="1"/>
+          <p:nvPr/>
+        </p:nvSpPr>
+        <p:spPr>
+          <a:xfrm>
+            <a:off x="10548994" y="2733960"/>
+            <a:ext cx="710451" cy="369332"/>
+          </a:xfrm>
+          <a:prstGeom prst="rect">
+            <a:avLst/>
+          </a:prstGeom>
+          <a:noFill/>
+        </p:spPr>
+        <p:txBody>
+          <a:bodyPr wrap="none" rtlCol="0">
+            <a:spAutoFit/>
+          </a:bodyPr>
+          <a:lstStyle/>
+          <a:p>
+            <a:r>
+              <a:rPr lang="en-US" dirty="0">
+                <a:solidFill>
+                  <a:srgbClr val="FFFF00"/>
+                </a:solidFill>
+              </a:rPr>
+              <a:t>0.020</a:t>
+            </a:r>
+          </a:p>
+        </p:txBody>
+      </p:sp>
+      <p:sp>
+        <p:nvSpPr>
+          <p:cNvPr id="47" name="TextBox 46">
+            <a:extLst>
+              <a:ext uri="{FF2B5EF4-FFF2-40B4-BE49-F238E27FC236}">
+                <a16:creationId xmlns:a16="http://schemas.microsoft.com/office/drawing/2014/main" id="{CFC04B98-DA09-270B-DFA7-661B1F70C772}"/>
+              </a:ext>
+            </a:extLst>
+          </p:cNvPr>
+          <p:cNvSpPr txBox="1"/>
+          <p:nvPr/>
+        </p:nvSpPr>
+        <p:spPr>
+          <a:xfrm>
+            <a:off x="9449063" y="2757152"/>
+            <a:ext cx="710451" cy="369332"/>
+          </a:xfrm>
+          <a:prstGeom prst="rect">
+            <a:avLst/>
+          </a:prstGeom>
+          <a:noFill/>
+        </p:spPr>
+        <p:txBody>
+          <a:bodyPr wrap="none" rtlCol="0">
+            <a:spAutoFit/>
+          </a:bodyPr>
+          <a:lstStyle/>
+          <a:p>
+            <a:r>
+              <a:rPr lang="en-US" dirty="0">
+                <a:solidFill>
+                  <a:srgbClr val="FFFF00"/>
+                </a:solidFill>
+              </a:rPr>
+              <a:t>0.010</a:t>
+            </a:r>
+          </a:p>
+        </p:txBody>
+      </p:sp>
+      <p:sp>
+        <p:nvSpPr>
+          <p:cNvPr id="48" name="TextBox 47">
+            <a:extLst>
+              <a:ext uri="{FF2B5EF4-FFF2-40B4-BE49-F238E27FC236}">
+                <a16:creationId xmlns:a16="http://schemas.microsoft.com/office/drawing/2014/main" id="{85A00427-9F22-BE99-70A9-03415F04E5F6}"/>
+              </a:ext>
+            </a:extLst>
+          </p:cNvPr>
+          <p:cNvSpPr txBox="1"/>
+          <p:nvPr/>
+        </p:nvSpPr>
+        <p:spPr>
+          <a:xfrm>
+            <a:off x="8490876" y="3964360"/>
+            <a:ext cx="301686" cy="369332"/>
+          </a:xfrm>
+          <a:prstGeom prst="rect">
+            <a:avLst/>
+          </a:prstGeom>
+          <a:noFill/>
+        </p:spPr>
+        <p:txBody>
+          <a:bodyPr wrap="none" rtlCol="0">
+            <a:spAutoFit/>
+          </a:bodyPr>
+          <a:lstStyle/>
+          <a:p>
+            <a:r>
+              <a:rPr lang="en-US" dirty="0">
+                <a:solidFill>
+                  <a:srgbClr val="FFFF00"/>
+                </a:solidFill>
+              </a:rPr>
+              <a:t>0</a:t>
+            </a:r>
+          </a:p>
+        </p:txBody>
+      </p:sp>
+      <p:sp>
+        <p:nvSpPr>
+          <p:cNvPr id="49" name="TextBox 48">
+            <a:extLst>
+              <a:ext uri="{FF2B5EF4-FFF2-40B4-BE49-F238E27FC236}">
+                <a16:creationId xmlns:a16="http://schemas.microsoft.com/office/drawing/2014/main" id="{03AB7544-37A4-EA50-8092-A48BA40C0EAF}"/>
+              </a:ext>
+            </a:extLst>
+          </p:cNvPr>
+          <p:cNvSpPr txBox="1"/>
+          <p:nvPr/>
+        </p:nvSpPr>
+        <p:spPr>
+          <a:xfrm>
+            <a:off x="10753376" y="3964360"/>
+            <a:ext cx="301686" cy="369332"/>
+          </a:xfrm>
+          <a:prstGeom prst="rect">
+            <a:avLst/>
+          </a:prstGeom>
+          <a:noFill/>
+        </p:spPr>
+        <p:txBody>
+          <a:bodyPr wrap="none" rtlCol="0">
+            <a:spAutoFit/>
+          </a:bodyPr>
+          <a:lstStyle/>
+          <a:p>
+            <a:r>
+              <a:rPr lang="en-US" dirty="0">
+                <a:solidFill>
+                  <a:srgbClr val="FFFF00"/>
+                </a:solidFill>
+              </a:rPr>
+              <a:t>1</a:t>
+            </a:r>
+          </a:p>
+        </p:txBody>
+      </p:sp>
+      <p:sp>
+        <p:nvSpPr>
+          <p:cNvPr id="50" name="TextBox 49">
+            <a:extLst>
+              <a:ext uri="{FF2B5EF4-FFF2-40B4-BE49-F238E27FC236}">
+                <a16:creationId xmlns:a16="http://schemas.microsoft.com/office/drawing/2014/main" id="{DF1E0DB8-10D3-3F40-A149-AC4B8B208AD9}"/>
+              </a:ext>
+            </a:extLst>
+          </p:cNvPr>
+          <p:cNvSpPr txBox="1"/>
+          <p:nvPr/>
+        </p:nvSpPr>
+        <p:spPr>
+          <a:xfrm>
+            <a:off x="9561777" y="3941235"/>
+            <a:ext cx="476412" cy="369332"/>
+          </a:xfrm>
+          <a:prstGeom prst="rect">
+            <a:avLst/>
+          </a:prstGeom>
+          <a:noFill/>
+        </p:spPr>
+        <p:txBody>
+          <a:bodyPr wrap="none" rtlCol="0">
+            <a:spAutoFit/>
+          </a:bodyPr>
+          <a:lstStyle/>
+          <a:p>
+            <a:r>
+              <a:rPr lang="en-US" dirty="0">
+                <a:solidFill>
+                  <a:srgbClr val="FFFF00"/>
+                </a:solidFill>
+              </a:rPr>
+              <a:t>0.5</a:t>
+            </a:r>
+          </a:p>
+        </p:txBody>
+      </p:sp>
+      <p:sp>
+        <p:nvSpPr>
+          <p:cNvPr id="51" name="TextBox 50">
+            <a:extLst>
+              <a:ext uri="{FF2B5EF4-FFF2-40B4-BE49-F238E27FC236}">
+                <a16:creationId xmlns:a16="http://schemas.microsoft.com/office/drawing/2014/main" id="{092AE04F-B32D-1025-3A1C-BBD3B53FE655}"/>
+              </a:ext>
+            </a:extLst>
+          </p:cNvPr>
+          <p:cNvSpPr txBox="1"/>
+          <p:nvPr/>
+        </p:nvSpPr>
+        <p:spPr>
+          <a:xfrm>
+            <a:off x="7852245" y="5193563"/>
+            <a:ext cx="301686" cy="369332"/>
+          </a:xfrm>
+          <a:prstGeom prst="rect">
+            <a:avLst/>
+          </a:prstGeom>
+          <a:noFill/>
+        </p:spPr>
+        <p:txBody>
+          <a:bodyPr wrap="none" rtlCol="0">
+            <a:spAutoFit/>
+          </a:bodyPr>
+          <a:lstStyle/>
+          <a:p>
+            <a:r>
+              <a:rPr lang="en-US" dirty="0">
+                <a:solidFill>
+                  <a:srgbClr val="FFFF00"/>
+                </a:solidFill>
+              </a:rPr>
+              <a:t>0</a:t>
+            </a:r>
+          </a:p>
+        </p:txBody>
+      </p:sp>
+      <p:sp>
+        <p:nvSpPr>
+          <p:cNvPr id="52" name="TextBox 51">
+            <a:extLst>
+              <a:ext uri="{FF2B5EF4-FFF2-40B4-BE49-F238E27FC236}">
+                <a16:creationId xmlns:a16="http://schemas.microsoft.com/office/drawing/2014/main" id="{5920FBD2-4C70-34C3-9507-757CAC217F2D}"/>
+              </a:ext>
+            </a:extLst>
+          </p:cNvPr>
+          <p:cNvSpPr txBox="1"/>
+          <p:nvPr/>
+        </p:nvSpPr>
+        <p:spPr>
+          <a:xfrm>
+            <a:off x="11200238" y="5180985"/>
+            <a:ext cx="535724" cy="369332"/>
+          </a:xfrm>
+          <a:prstGeom prst="rect">
+            <a:avLst/>
+          </a:prstGeom>
+          <a:noFill/>
+        </p:spPr>
+        <p:txBody>
+          <a:bodyPr wrap="none" rtlCol="0">
+            <a:spAutoFit/>
+          </a:bodyPr>
+          <a:lstStyle/>
+          <a:p>
+            <a:r>
+              <a:rPr lang="en-US" dirty="0">
+                <a:solidFill>
+                  <a:srgbClr val="FFFF00"/>
+                </a:solidFill>
+              </a:rPr>
+              <a:t>100</a:t>
+            </a:r>
+          </a:p>
+        </p:txBody>
+      </p:sp>
+      <p:sp>
+        <p:nvSpPr>
+          <p:cNvPr id="55" name="TextBox 54">
+            <a:extLst>
+              <a:ext uri="{FF2B5EF4-FFF2-40B4-BE49-F238E27FC236}">
+                <a16:creationId xmlns:a16="http://schemas.microsoft.com/office/drawing/2014/main" id="{890D6360-DEA2-7C2A-811A-6EB80106BE06}"/>
+              </a:ext>
+            </a:extLst>
+          </p:cNvPr>
+          <p:cNvSpPr txBox="1"/>
+          <p:nvPr/>
+        </p:nvSpPr>
+        <p:spPr>
+          <a:xfrm>
+            <a:off x="9565092" y="5196878"/>
+            <a:ext cx="418704" cy="369332"/>
+          </a:xfrm>
+          <a:prstGeom prst="rect">
+            <a:avLst/>
+          </a:prstGeom>
+          <a:noFill/>
+        </p:spPr>
+        <p:txBody>
+          <a:bodyPr wrap="none" rtlCol="0">
+            <a:spAutoFit/>
+          </a:bodyPr>
+          <a:lstStyle/>
+          <a:p>
+            <a:r>
+              <a:rPr lang="en-US" dirty="0">
+                <a:solidFill>
+                  <a:srgbClr val="FFFF00"/>
+                </a:solidFill>
+              </a:rPr>
+              <a:t>50</a:t>
+            </a:r>
+          </a:p>
+        </p:txBody>
+      </p:sp>
+      <p:sp>
+        <p:nvSpPr>
+          <p:cNvPr id="56" name="Arrow: Curved Down 55">
+            <a:extLst>
+              <a:ext uri="{FF2B5EF4-FFF2-40B4-BE49-F238E27FC236}">
+                <a16:creationId xmlns:a16="http://schemas.microsoft.com/office/drawing/2014/main" id="{F442EB9F-FCC8-3D84-5E63-A5A1EC833D9E}"/>
+              </a:ext>
+            </a:extLst>
+          </p:cNvPr>
+          <p:cNvSpPr/>
+          <p:nvPr/>
+        </p:nvSpPr>
+        <p:spPr>
+          <a:xfrm rot="5400000">
+            <a:off x="10666311" y="3447766"/>
+            <a:ext cx="1659334" cy="881835"/>
+          </a:xfrm>
+          <a:prstGeom prst="curvedDownArrow">
+            <a:avLst/>
+          </a:prstGeom>
+          <a:noFill/>
+          <a:ln w="9525" cap="flat" cmpd="sng" algn="ctr">
+            <a:solidFill>
+              <a:schemeClr val="accent5"/>
+            </a:solidFill>
+            <a:prstDash val="solid"/>
+            <a:round/>
+            <a:headEnd type="none" w="med" len="med"/>
+            <a:tailEnd type="none" w="med" len="med"/>
+          </a:ln>
+        </p:spPr>
+        <p:style>
+          <a:lnRef idx="0">
+            <a:scrgbClr r="0" g="0" b="0"/>
+          </a:lnRef>
+          <a:fillRef idx="0">
+            <a:scrgbClr r="0" g="0" b="0"/>
+          </a:fillRef>
+          <a:effectRef idx="0">
+            <a:scrgbClr r="0" g="0" b="0"/>
+          </a:effectRef>
+          <a:fontRef idx="minor">
+            <a:schemeClr val="accent5"/>
+          </a:fontRef>
+        </p:style>
+        <p:txBody>
+          <a:bodyPr rtlCol="0" anchor="ctr"/>
+          <a:lstStyle/>
+          <a:p>
+            <a:pPr algn="ctr"/>
+            <a:endParaRPr lang="en-US">
+              <a:solidFill>
+                <a:schemeClr val="tx1"/>
+              </a:solidFill>
+            </a:endParaRPr>
+          </a:p>
+        </p:txBody>
+      </p:sp>
+      <p:sp>
+        <p:nvSpPr>
+          <p:cNvPr id="57" name="Arrow: Curved Down 56">
+            <a:extLst>
+              <a:ext uri="{FF2B5EF4-FFF2-40B4-BE49-F238E27FC236}">
+                <a16:creationId xmlns:a16="http://schemas.microsoft.com/office/drawing/2014/main" id="{5A61A3BE-2D68-1CF4-1EF1-B3EF6A00912F}"/>
+              </a:ext>
+            </a:extLst>
+          </p:cNvPr>
+          <p:cNvSpPr/>
+          <p:nvPr/>
+        </p:nvSpPr>
+        <p:spPr>
+          <a:xfrm rot="5400000" flipV="1">
+            <a:off x="6675690" y="4726166"/>
+            <a:ext cx="1535125" cy="865456"/>
+          </a:xfrm>
+          <a:prstGeom prst="curvedDownArrow">
+            <a:avLst>
+              <a:gd name="adj1" fmla="val 25000"/>
+              <a:gd name="adj2" fmla="val 69273"/>
+              <a:gd name="adj3" fmla="val 25000"/>
+            </a:avLst>
+          </a:prstGeom>
+          <a:noFill/>
+          <a:ln w="9525" cap="flat" cmpd="sng" algn="ctr">
+            <a:solidFill>
+              <a:schemeClr val="accent5"/>
+            </a:solidFill>
+            <a:prstDash val="solid"/>
+            <a:round/>
+            <a:headEnd type="none" w="med" len="med"/>
+            <a:tailEnd type="none" w="med" len="med"/>
+          </a:ln>
+        </p:spPr>
+        <p:style>
+          <a:lnRef idx="0">
+            <a:scrgbClr r="0" g="0" b="0"/>
+          </a:lnRef>
+          <a:fillRef idx="0">
+            <a:scrgbClr r="0" g="0" b="0"/>
+          </a:fillRef>
+          <a:effectRef idx="0">
+            <a:scrgbClr r="0" g="0" b="0"/>
+          </a:effectRef>
+          <a:fontRef idx="minor">
+            <a:schemeClr val="accent5"/>
+          </a:fontRef>
+        </p:style>
+        <p:txBody>
+          <a:bodyPr rtlCol="0" anchor="ctr"/>
+          <a:lstStyle/>
+          <a:p>
+            <a:pPr algn="ctr"/>
+            <a:endParaRPr lang="en-US">
+              <a:solidFill>
+                <a:schemeClr val="tx1"/>
+              </a:solidFill>
+            </a:endParaRPr>
+          </a:p>
+        </p:txBody>
+      </p:sp>
+      <p:sp>
+        <p:nvSpPr>
+          <p:cNvPr id="58" name="Rectangle 57">
+            <a:extLst>
+              <a:ext uri="{FF2B5EF4-FFF2-40B4-BE49-F238E27FC236}">
+                <a16:creationId xmlns:a16="http://schemas.microsoft.com/office/drawing/2014/main" id="{B1B8A696-D534-EC7A-738A-8706DA7D561B}"/>
+              </a:ext>
+            </a:extLst>
+          </p:cNvPr>
+          <p:cNvSpPr/>
+          <p:nvPr/>
+        </p:nvSpPr>
+        <p:spPr>
+          <a:xfrm>
+            <a:off x="7875981" y="4391329"/>
+            <a:ext cx="664766" cy="214008"/>
+          </a:xfrm>
+          <a:prstGeom prst="rect">
+            <a:avLst/>
+          </a:prstGeom>
+          <a:noFill/>
+          <a:ln w="9525" cap="flat" cmpd="sng" algn="ctr">
+            <a:solidFill>
+              <a:schemeClr val="accent5"/>
+            </a:solidFill>
+            <a:prstDash val="solid"/>
+            <a:round/>
+            <a:headEnd type="none" w="med" len="med"/>
+            <a:tailEnd type="none" w="med" len="med"/>
+          </a:ln>
+        </p:spPr>
+        <p:style>
+          <a:lnRef idx="0">
+            <a:scrgbClr r="0" g="0" b="0"/>
+          </a:lnRef>
+          <a:fillRef idx="0">
+            <a:scrgbClr r="0" g="0" b="0"/>
+          </a:fillRef>
+          <a:effectRef idx="0">
+            <a:scrgbClr r="0" g="0" b="0"/>
+          </a:effectRef>
+          <a:fontRef idx="minor">
+            <a:schemeClr val="accent5"/>
+          </a:fontRef>
+        </p:style>
+        <p:txBody>
+          <a:bodyPr rtlCol="0" anchor="ctr"/>
+          <a:lstStyle/>
+          <a:p>
+            <a:pPr algn="ctr"/>
+            <a:endParaRPr lang="en-US"/>
+          </a:p>
+        </p:txBody>
+      </p:sp>
+      <p:cxnSp>
+        <p:nvCxnSpPr>
+          <p:cNvPr id="60" name="Straight Arrow Connector 59">
+            <a:extLst>
+              <a:ext uri="{FF2B5EF4-FFF2-40B4-BE49-F238E27FC236}">
+                <a16:creationId xmlns:a16="http://schemas.microsoft.com/office/drawing/2014/main" id="{DDCD85F9-5568-D394-D99D-73C6C4374587}"/>
+              </a:ext>
+            </a:extLst>
+          </p:cNvPr>
+          <p:cNvCxnSpPr>
+            <a:cxnSpLocks/>
+            <a:endCxn id="45" idx="1"/>
+          </p:cNvCxnSpPr>
+          <p:nvPr/>
+        </p:nvCxnSpPr>
+        <p:spPr>
+          <a:xfrm flipV="1">
+            <a:off x="4969721" y="2939830"/>
+            <a:ext cx="3396044" cy="861455"/>
+          </a:xfrm>
+          <a:prstGeom prst="straightConnector1">
+            <a:avLst/>
+          </a:prstGeom>
+          <a:ln w="9525" cap="flat" cmpd="sng" algn="ctr">
+            <a:solidFill>
+              <a:schemeClr val="accent1"/>
+            </a:solidFill>
+            <a:prstDash val="dash"/>
+            <a:round/>
+            <a:headEnd type="none" w="med" len="med"/>
+            <a:tailEnd type="none" w="med" len="med"/>
+          </a:ln>
+        </p:spPr>
+        <p:style>
+          <a:lnRef idx="0">
+            <a:scrgbClr r="0" g="0" b="0"/>
+          </a:lnRef>
+          <a:fillRef idx="0">
+            <a:scrgbClr r="0" g="0" b="0"/>
+          </a:fillRef>
+          <a:effectRef idx="0">
+            <a:scrgbClr r="0" g="0" b="0"/>
+          </a:effectRef>
+          <a:fontRef idx="minor">
+            <a:schemeClr val="tx1"/>
+          </a:fontRef>
+        </p:style>
+      </p:cxnSp>
+      <p:cxnSp>
+        <p:nvCxnSpPr>
+          <p:cNvPr id="63" name="Straight Arrow Connector 62">
+            <a:extLst>
+              <a:ext uri="{FF2B5EF4-FFF2-40B4-BE49-F238E27FC236}">
+                <a16:creationId xmlns:a16="http://schemas.microsoft.com/office/drawing/2014/main" id="{08235A76-BB94-FC42-6BC3-C475120B79D0}"/>
+              </a:ext>
+            </a:extLst>
+          </p:cNvPr>
+          <p:cNvCxnSpPr>
+            <a:cxnSpLocks/>
+          </p:cNvCxnSpPr>
+          <p:nvPr/>
+        </p:nvCxnSpPr>
+        <p:spPr>
+          <a:xfrm flipV="1">
+            <a:off x="6069477" y="2987882"/>
+            <a:ext cx="4558786" cy="813403"/>
+          </a:xfrm>
+          <a:prstGeom prst="straightConnector1">
+            <a:avLst/>
+          </a:prstGeom>
+          <a:ln w="9525" cap="flat" cmpd="sng" algn="ctr">
+            <a:solidFill>
+              <a:schemeClr val="accent1"/>
+            </a:solidFill>
+            <a:prstDash val="dash"/>
+            <a:round/>
+            <a:headEnd type="none" w="med" len="med"/>
+            <a:tailEnd type="none" w="med" len="med"/>
+          </a:ln>
+        </p:spPr>
+        <p:style>
+          <a:lnRef idx="0">
+            <a:scrgbClr r="0" g="0" b="0"/>
+          </a:lnRef>
+          <a:fillRef idx="0">
+            <a:scrgbClr r="0" g="0" b="0"/>
+          </a:fillRef>
+          <a:effectRef idx="0">
+            <a:scrgbClr r="0" g="0" b="0"/>
+          </a:effectRef>
+          <a:fontRef idx="minor">
+            <a:schemeClr val="tx1"/>
+          </a:fontRef>
+        </p:style>
+      </p:cxnSp>
+      <p:cxnSp>
+        <p:nvCxnSpPr>
+          <p:cNvPr id="65" name="Straight Arrow Connector 64">
+            <a:extLst>
+              <a:ext uri="{FF2B5EF4-FFF2-40B4-BE49-F238E27FC236}">
+                <a16:creationId xmlns:a16="http://schemas.microsoft.com/office/drawing/2014/main" id="{EEFCFE24-B35A-C889-5F8E-31A562D67233}"/>
+              </a:ext>
+            </a:extLst>
+          </p:cNvPr>
+          <p:cNvCxnSpPr>
+            <a:cxnSpLocks/>
+            <a:endCxn id="48" idx="1"/>
+          </p:cNvCxnSpPr>
+          <p:nvPr/>
+        </p:nvCxnSpPr>
+        <p:spPr>
+          <a:xfrm flipV="1">
+            <a:off x="1684867" y="4149026"/>
+            <a:ext cx="6806009" cy="182410"/>
+          </a:xfrm>
+          <a:prstGeom prst="straightConnector1">
+            <a:avLst/>
+          </a:prstGeom>
+          <a:ln w="9525" cap="flat" cmpd="sng" algn="ctr">
+            <a:solidFill>
+              <a:schemeClr val="accent1"/>
+            </a:solidFill>
+            <a:prstDash val="dash"/>
+            <a:round/>
+            <a:headEnd type="none" w="med" len="med"/>
+            <a:tailEnd type="none" w="med" len="med"/>
+          </a:ln>
+        </p:spPr>
+        <p:style>
+          <a:lnRef idx="0">
+            <a:scrgbClr r="0" g="0" b="0"/>
+          </a:lnRef>
+          <a:fillRef idx="0">
+            <a:scrgbClr r="0" g="0" b="0"/>
+          </a:fillRef>
+          <a:effectRef idx="0">
+            <a:scrgbClr r="0" g="0" b="0"/>
+          </a:effectRef>
+          <a:fontRef idx="minor">
+            <a:schemeClr val="tx1"/>
+          </a:fontRef>
+        </p:style>
+      </p:cxnSp>
+      <p:cxnSp>
+        <p:nvCxnSpPr>
+          <p:cNvPr id="68" name="Straight Arrow Connector 67">
+            <a:extLst>
+              <a:ext uri="{FF2B5EF4-FFF2-40B4-BE49-F238E27FC236}">
+                <a16:creationId xmlns:a16="http://schemas.microsoft.com/office/drawing/2014/main" id="{CACBA8FB-9088-4383-6548-191224904339}"/>
+              </a:ext>
+            </a:extLst>
+          </p:cNvPr>
+          <p:cNvCxnSpPr>
+            <a:cxnSpLocks/>
+            <a:endCxn id="51" idx="1"/>
+          </p:cNvCxnSpPr>
+          <p:nvPr/>
+        </p:nvCxnSpPr>
+        <p:spPr>
+          <a:xfrm>
+            <a:off x="1418385" y="4718351"/>
+            <a:ext cx="6433860" cy="659878"/>
+          </a:xfrm>
+          <a:prstGeom prst="straightConnector1">
+            <a:avLst/>
+          </a:prstGeom>
+          <a:ln w="9525" cap="flat" cmpd="sng" algn="ctr">
+            <a:solidFill>
+              <a:schemeClr val="accent1"/>
+            </a:solidFill>
+            <a:prstDash val="dash"/>
+            <a:round/>
+            <a:headEnd type="none" w="med" len="med"/>
+            <a:tailEnd type="none" w="med" len="med"/>
+          </a:ln>
+        </p:spPr>
+        <p:style>
+          <a:lnRef idx="0">
+            <a:scrgbClr r="0" g="0" b="0"/>
+          </a:lnRef>
+          <a:fillRef idx="0">
+            <a:scrgbClr r="0" g="0" b="0"/>
+          </a:fillRef>
+          <a:effectRef idx="0">
+            <a:scrgbClr r="0" g="0" b="0"/>
+          </a:effectRef>
+          <a:fontRef idx="minor">
+            <a:schemeClr val="tx1"/>
+          </a:fontRef>
+        </p:style>
+      </p:cxnSp>
+    </p:spTree>
+    <p:extLst>
+      <p:ext uri="{BB962C8B-B14F-4D97-AF65-F5344CB8AC3E}">
+        <p14:creationId xmlns:p14="http://schemas.microsoft.com/office/powerpoint/2010/main" val="2895279292"/>
+      </p:ext>
+    </p:extLst>
+  </p:cSld>
+  <p:clrMapOvr>
+    <a:masterClrMapping/>
+  </p:clrMapOvr>
+</p:sld>
+</file>
+
 <file path=ppt/theme/theme1.xml><?xml version="1.0" encoding="utf-8"?>
 <a:theme xmlns:a="http://schemas.openxmlformats.org/drawingml/2006/main" name="Office Theme">
   <a:themeElements>

</xml_diff>